<commit_message>
Update Final Presentation Powerpoint
</commit_message>
<xml_diff>
--- a/Documents/Final_Presentation.pptx
+++ b/Documents/Final_Presentation.pptx
@@ -19876,6 +19876,20 @@
               </a:rPr>
               <a:t>Link to Paper: </a:t>
             </a:r>
+            <a:r>
+              <a:rPr lang="en-US" sz="1800" i="0" u="sng" dirty="0">
+                <a:solidFill>
+                  <a:srgbClr val="1155CC"/>
+                </a:solidFill>
+                <a:effectLst/>
+                <a:latin typeface="+mj-lt"/>
+                <a:hlinkClick r:id="rId2"/>
+              </a:rPr>
+              <a:t>https://openreview.net/forum?id=6quJeu5gJ7</a:t>
+            </a:r>
+            <a:endParaRPr lang="en-US" sz="1600" dirty="0">
+              <a:latin typeface="+mj-lt"/>
+            </a:endParaRPr>
           </a:p>
           <a:p>
             <a:pPr marL="0" indent="0" algn="ctr">
@@ -19894,7 +19908,7 @@
                 </a:solidFill>
                 <a:effectLst/>
                 <a:latin typeface="+mj-lt"/>
-                <a:hlinkClick r:id="rId2"/>
+                <a:hlinkClick r:id="rId3"/>
               </a:rPr>
               <a:t>https://github.com/prob-ml/DynST?utm_source=chatgpt.com</a:t>
             </a:r>

</xml_diff>

<commit_message>
Final version of Final Presentation
Uploaded final presentation with video link
</commit_message>
<xml_diff>
--- a/Documents/Final_Presentation.pptx
+++ b/Documents/Final_Presentation.pptx
@@ -871,7 +871,7 @@
           <a:p>
             <a:fld id="{96005A4A-28F8-4ABD-999F-1F27FB8D3E9D}" type="datetimeFigureOut">
               <a:rPr lang="en-US" smtClean="0"/>
-              <a:t>4/10/2025</a:t>
+              <a:t>4/16/2025</a:t>
             </a:fld>
             <a:endParaRPr lang="en-US"/>
           </a:p>
@@ -1376,7 +1376,7 @@
           <a:p>
             <a:fld id="{CA45900F-8197-41DD-80E9-9984B088E351}" type="datetimeFigureOut">
               <a:rPr lang="en-US" smtClean="0"/>
-              <a:t>4/10/2025</a:t>
+              <a:t>4/16/2025</a:t>
             </a:fld>
             <a:endParaRPr lang="en-US"/>
           </a:p>
@@ -1574,7 +1574,7 @@
           <a:p>
             <a:fld id="{CA45900F-8197-41DD-80E9-9984B088E351}" type="datetimeFigureOut">
               <a:rPr lang="en-US" smtClean="0"/>
-              <a:t>4/10/2025</a:t>
+              <a:t>4/16/2025</a:t>
             </a:fld>
             <a:endParaRPr lang="en-US"/>
           </a:p>
@@ -1782,7 +1782,7 @@
           <a:p>
             <a:fld id="{CA45900F-8197-41DD-80E9-9984B088E351}" type="datetimeFigureOut">
               <a:rPr lang="en-US" smtClean="0"/>
-              <a:t>4/10/2025</a:t>
+              <a:t>4/16/2025</a:t>
             </a:fld>
             <a:endParaRPr lang="en-US"/>
           </a:p>
@@ -1980,7 +1980,7 @@
           <a:p>
             <a:fld id="{CA45900F-8197-41DD-80E9-9984B088E351}" type="datetimeFigureOut">
               <a:rPr lang="en-US" smtClean="0"/>
-              <a:t>4/10/2025</a:t>
+              <a:t>4/16/2025</a:t>
             </a:fld>
             <a:endParaRPr lang="en-US"/>
           </a:p>
@@ -2255,7 +2255,7 @@
           <a:p>
             <a:fld id="{CA45900F-8197-41DD-80E9-9984B088E351}" type="datetimeFigureOut">
               <a:rPr lang="en-US" smtClean="0"/>
-              <a:t>4/10/2025</a:t>
+              <a:t>4/16/2025</a:t>
             </a:fld>
             <a:endParaRPr lang="en-US"/>
           </a:p>
@@ -2520,7 +2520,7 @@
           <a:p>
             <a:fld id="{CA45900F-8197-41DD-80E9-9984B088E351}" type="datetimeFigureOut">
               <a:rPr lang="en-US" smtClean="0"/>
-              <a:t>4/10/2025</a:t>
+              <a:t>4/16/2025</a:t>
             </a:fld>
             <a:endParaRPr lang="en-US"/>
           </a:p>
@@ -2932,7 +2932,7 @@
           <a:p>
             <a:fld id="{CA45900F-8197-41DD-80E9-9984B088E351}" type="datetimeFigureOut">
               <a:rPr lang="en-US" smtClean="0"/>
-              <a:t>4/10/2025</a:t>
+              <a:t>4/16/2025</a:t>
             </a:fld>
             <a:endParaRPr lang="en-US"/>
           </a:p>
@@ -3073,7 +3073,7 @@
           <a:p>
             <a:fld id="{CA45900F-8197-41DD-80E9-9984B088E351}" type="datetimeFigureOut">
               <a:rPr lang="en-US" smtClean="0"/>
-              <a:t>4/10/2025</a:t>
+              <a:t>4/16/2025</a:t>
             </a:fld>
             <a:endParaRPr lang="en-US"/>
           </a:p>
@@ -3186,7 +3186,7 @@
           <a:p>
             <a:fld id="{CA45900F-8197-41DD-80E9-9984B088E351}" type="datetimeFigureOut">
               <a:rPr lang="en-US" smtClean="0"/>
-              <a:t>4/10/2025</a:t>
+              <a:t>4/16/2025</a:t>
             </a:fld>
             <a:endParaRPr lang="en-US"/>
           </a:p>
@@ -3497,7 +3497,7 @@
           <a:p>
             <a:fld id="{CA45900F-8197-41DD-80E9-9984B088E351}" type="datetimeFigureOut">
               <a:rPr lang="en-US" smtClean="0"/>
-              <a:t>4/10/2025</a:t>
+              <a:t>4/16/2025</a:t>
             </a:fld>
             <a:endParaRPr lang="en-US"/>
           </a:p>
@@ -3785,7 +3785,7 @@
           <a:p>
             <a:fld id="{CA45900F-8197-41DD-80E9-9984B088E351}" type="datetimeFigureOut">
               <a:rPr lang="en-US" smtClean="0"/>
-              <a:t>4/10/2025</a:t>
+              <a:t>4/16/2025</a:t>
             </a:fld>
             <a:endParaRPr lang="en-US"/>
           </a:p>
@@ -4026,7 +4026,7 @@
           <a:p>
             <a:fld id="{CA45900F-8197-41DD-80E9-9984B088E351}" type="datetimeFigureOut">
               <a:rPr lang="en-US" smtClean="0"/>
-              <a:t>4/10/2025</a:t>
+              <a:t>4/16/2025</a:t>
             </a:fld>
             <a:endParaRPr lang="en-US"/>
           </a:p>
@@ -13875,7 +13875,7 @@
         <p:spPr>
           <a:xfrm>
             <a:off x="3049859" y="4754933"/>
-            <a:ext cx="6779941" cy="307777"/>
+            <a:ext cx="6779941" cy="523220"/>
           </a:xfrm>
           <a:prstGeom prst="rect">
             <a:avLst/>
@@ -13898,6 +13898,19 @@
               </a:rPr>
               <a:t>https://github.com/csheridan30/CSE6250_TeamA1_Spring2025_Project</a:t>
             </a:r>
+            <a:endParaRPr lang="en-US" sz="1400" dirty="0"/>
+          </a:p>
+          <a:p>
+            <a:r>
+              <a:rPr lang="en-US" sz="1400" dirty="0"/>
+              <a:t>Video: </a:t>
+            </a:r>
+            <a:r>
+              <a:rPr lang="en-US" sz="1400" dirty="0">
+                <a:hlinkClick r:id="rId4"/>
+              </a:rPr>
+              <a:t>https://youtu.be/UembQgz2m1Y</a:t>
+            </a:r>
             <a:r>
               <a:rPr lang="en-US" sz="1400" dirty="0"/>
               <a:t> </a:t>
@@ -13915,6 +13928,14 @@
   <p:clrMapOvr>
     <a:masterClrMapping/>
   </p:clrMapOvr>
+  <mc:AlternateContent xmlns:mc="http://schemas.openxmlformats.org/markup-compatibility/2006">
+    <mc:Choice xmlns:p14="http://schemas.microsoft.com/office/powerpoint/2010/main" Requires="p14">
+      <p:transition spd="slow" p14:dur="2000" advTm="685"/>
+    </mc:Choice>
+    <mc:Fallback>
+      <p:transition spd="slow" advTm="685"/>
+    </mc:Fallback>
+  </mc:AlternateContent>
 </p:sld>
 </file>
 
@@ -18645,7 +18666,7 @@
         <p:spPr>
           <a:xfrm>
             <a:off x="838200" y="3591612"/>
-            <a:ext cx="10515600" cy="2585323"/>
+            <a:ext cx="10515600" cy="2862322"/>
           </a:xfrm>
           <a:prstGeom prst="rect">
             <a:avLst/>
@@ -18706,6 +18727,16 @@
             <a:r>
               <a:rPr lang="en-US" dirty="0"/>
               <a:t>Our model is initialized on a different random seed than the paper’s (42 vs 0)</a:t>
+            </a:r>
+          </a:p>
+          <a:p>
+            <a:pPr marL="742950" lvl="1" indent="-285750">
+              <a:buFontTx/>
+              <a:buChar char="-"/>
+            </a:pPr>
+            <a:r>
+              <a:rPr lang="en-US" dirty="0"/>
+              <a:t>Though the difference caused by this seed is likely negligible.</a:t>
             </a:r>
           </a:p>
         </p:txBody>
@@ -18976,6 +19007,58 @@
                                           <p:spTgt spid="5">
                                             <p:txEl>
                                               <p:pRg st="6" end="6"/>
+                                            </p:txEl>
+                                          </p:spTgt>
+                                        </p:tgtEl>
+                                      </p:cBhvr>
+                                    </p:animEffect>
+                                  </p:childTnLst>
+                                </p:cTn>
+                              </p:par>
+                            </p:childTnLst>
+                          </p:cTn>
+                        </p:par>
+                        <p:par>
+                          <p:cTn id="21" fill="hold">
+                            <p:stCondLst>
+                              <p:cond delay="1500"/>
+                            </p:stCondLst>
+                            <p:childTnLst>
+                              <p:par>
+                                <p:cTn id="22" presetID="22" presetClass="entr" presetSubtype="8" fill="hold" nodeType="afterEffect">
+                                  <p:stCondLst>
+                                    <p:cond delay="0"/>
+                                  </p:stCondLst>
+                                  <p:childTnLst>
+                                    <p:set>
+                                      <p:cBhvr>
+                                        <p:cTn id="23" dur="1" fill="hold">
+                                          <p:stCondLst>
+                                            <p:cond delay="0"/>
+                                          </p:stCondLst>
+                                        </p:cTn>
+                                        <p:tgtEl>
+                                          <p:spTgt spid="5">
+                                            <p:txEl>
+                                              <p:pRg st="7" end="7"/>
+                                            </p:txEl>
+                                          </p:spTgt>
+                                        </p:tgtEl>
+                                        <p:attrNameLst>
+                                          <p:attrName>style.visibility</p:attrName>
+                                        </p:attrNameLst>
+                                      </p:cBhvr>
+                                      <p:to>
+                                        <p:strVal val="visible"/>
+                                      </p:to>
+                                    </p:set>
+                                    <p:animEffect transition="in" filter="wipe(left)">
+                                      <p:cBhvr>
+                                        <p:cTn id="24" dur="500"/>
+                                        <p:tgtEl>
+                                          <p:spTgt spid="5">
+                                            <p:txEl>
+                                              <p:pRg st="7" end="7"/>
                                             </p:txEl>
                                           </p:spTgt>
                                         </p:tgtEl>
@@ -19928,6 +20011,14 @@
   <p:clrMapOvr>
     <a:masterClrMapping/>
   </p:clrMapOvr>
+  <mc:AlternateContent xmlns:mc="http://schemas.openxmlformats.org/markup-compatibility/2006">
+    <mc:Choice xmlns:p14="http://schemas.microsoft.com/office/powerpoint/2010/main" Requires="p14">
+      <p:transition spd="slow" p14:dur="2000" advTm="2653"/>
+    </mc:Choice>
+    <mc:Fallback>
+      <p:transition spd="slow" advTm="2653"/>
+    </mc:Fallback>
+  </mc:AlternateContent>
 </p:sld>
 </file>
 
@@ -20041,6 +20132,9 @@
         </p:txBody>
       </p:sp>
     </p:spTree>
+    <p:custDataLst>
+      <p:tags r:id="rId1"/>
+    </p:custDataLst>
     <p:extLst>
       <p:ext uri="{BB962C8B-B14F-4D97-AF65-F5344CB8AC3E}">
         <p14:creationId xmlns:p14="http://schemas.microsoft.com/office/powerpoint/2010/main" val="2204686065"/>
@@ -20050,6 +20144,14 @@
   <p:clrMapOvr>
     <a:masterClrMapping/>
   </p:clrMapOvr>
+  <mc:AlternateContent xmlns:mc="http://schemas.openxmlformats.org/markup-compatibility/2006">
+    <mc:Choice xmlns:p14="http://schemas.microsoft.com/office/powerpoint/2010/main" Requires="p14">
+      <p:transition spd="slow" p14:dur="2000" advTm="3913"/>
+    </mc:Choice>
+    <mc:Fallback>
+      <p:transition spd="slow" advTm="3913"/>
+    </mc:Fallback>
+  </mc:AlternateContent>
   <p:timing>
     <p:tnLst>
       <p:par>
@@ -20411,7 +20513,7 @@
                 </a:solidFill>
                 <a:effectLst/>
                 <a:latin typeface="Roboto" panose="02000000000000000000" pitchFamily="2" charset="0"/>
-                <a:hlinkClick r:id="rId2"/>
+                <a:hlinkClick r:id="rId3"/>
               </a:rPr>
               <a:t>https://github.com/MLforHealth/MIMIC_Extract</a:t>
             </a:r>
@@ -20425,7 +20527,7 @@
             </a:r>
             <a:r>
               <a:rPr lang="en-US" dirty="0">
-                <a:hlinkClick r:id="rId3"/>
+                <a:hlinkClick r:id="rId4"/>
               </a:rPr>
               <a:t>https://console.cloud.google.com/storage/browser/mimic_extract</a:t>
             </a:r>
@@ -20455,6 +20557,9 @@
         </p:txBody>
       </p:sp>
     </p:spTree>
+    <p:custDataLst>
+      <p:tags r:id="rId1"/>
+    </p:custDataLst>
     <p:extLst>
       <p:ext uri="{BB962C8B-B14F-4D97-AF65-F5344CB8AC3E}">
         <p14:creationId xmlns:p14="http://schemas.microsoft.com/office/powerpoint/2010/main" val="2721761537"/>
@@ -20464,6 +20569,14 @@
   <p:clrMapOvr>
     <a:masterClrMapping/>
   </p:clrMapOvr>
+  <mc:AlternateContent xmlns:mc="http://schemas.openxmlformats.org/markup-compatibility/2006">
+    <mc:Choice xmlns:p14="http://schemas.microsoft.com/office/powerpoint/2010/main" Requires="p14">
+      <p:transition spd="slow" p14:dur="2000" advTm="4810"/>
+    </mc:Choice>
+    <mc:Fallback>
+      <p:transition spd="slow" advTm="4810"/>
+    </mc:Fallback>
+  </mc:AlternateContent>
   <p:timing>
     <p:tnLst>
       <p:par>
@@ -20966,7 +21079,7 @@
             </p:nvSpPr>
             <p:spPr>
               <a:blipFill>
-                <a:blip r:embed="rId2"/>
+                <a:blip r:embed="rId3"/>
                 <a:stretch>
                   <a:fillRect l="-928" t="-2801" r="-638" b="-1261"/>
                 </a:stretch>
@@ -20988,6 +21101,9 @@
         </mc:Fallback>
       </mc:AlternateContent>
     </p:spTree>
+    <p:custDataLst>
+      <p:tags r:id="rId1"/>
+    </p:custDataLst>
     <p:extLst>
       <p:ext uri="{BB962C8B-B14F-4D97-AF65-F5344CB8AC3E}">
         <p14:creationId xmlns:p14="http://schemas.microsoft.com/office/powerpoint/2010/main" val="1050782926"/>
@@ -20997,6 +21113,14 @@
   <p:clrMapOvr>
     <a:masterClrMapping/>
   </p:clrMapOvr>
+  <mc:AlternateContent xmlns:mc="http://schemas.openxmlformats.org/markup-compatibility/2006">
+    <mc:Choice xmlns:p14="http://schemas.microsoft.com/office/powerpoint/2010/main" Requires="p14">
+      <p:transition spd="slow" p14:dur="2000" advTm="3228"/>
+    </mc:Choice>
+    <mc:Fallback>
+      <p:transition spd="slow" advTm="3228"/>
+    </mc:Fallback>
+  </mc:AlternateContent>
   <p:timing>
     <p:tnLst>
       <p:par>
@@ -28305,6 +28429,331 @@
           </a:p>
         </p:txBody>
       </p:sp>
+      <p:pic>
+        <p:nvPicPr>
+          <p:cNvPr id="6" name="Picture 5">
+            <a:extLst>
+              <a:ext uri="{FF2B5EF4-FFF2-40B4-BE49-F238E27FC236}">
+                <a16:creationId xmlns:a16="http://schemas.microsoft.com/office/drawing/2014/main" id="{93105796-9AE4-8D3C-4713-39FA30296115}"/>
+              </a:ext>
+            </a:extLst>
+          </p:cNvPr>
+          <p:cNvPicPr>
+            <a:picLocks noChangeAspect="1"/>
+          </p:cNvPicPr>
+          <p:nvPr/>
+        </p:nvPicPr>
+        <p:blipFill>
+          <a:blip r:embed="rId2">
+            <a:extLst>
+              <a:ext uri="{28A0092B-C50C-407E-A947-70E740481C1C}">
+                <a14:useLocalDpi xmlns:a14="http://schemas.microsoft.com/office/drawing/2010/main" val="0"/>
+              </a:ext>
+            </a:extLst>
+          </a:blip>
+          <a:srcRect/>
+          <a:stretch/>
+        </p:blipFill>
+        <p:spPr>
+          <a:xfrm>
+            <a:off x="2040673" y="512798"/>
+            <a:ext cx="7544008" cy="1960910"/>
+          </a:xfrm>
+          <a:prstGeom prst="rect">
+            <a:avLst/>
+          </a:prstGeom>
+        </p:spPr>
+      </p:pic>
+      <mc:AlternateContent xmlns:mc="http://schemas.openxmlformats.org/markup-compatibility/2006">
+        <mc:Choice xmlns:a14="http://schemas.microsoft.com/office/drawing/2010/main" Requires="a14">
+          <p:sp>
+            <p:nvSpPr>
+              <p:cNvPr id="7" name="TextBox 6">
+                <a:extLst>
+                  <a:ext uri="{FF2B5EF4-FFF2-40B4-BE49-F238E27FC236}">
+                    <a16:creationId xmlns:a16="http://schemas.microsoft.com/office/drawing/2014/main" id="{99DEA6DD-9A59-E301-5AB0-E4E824F27029}"/>
+                  </a:ext>
+                </a:extLst>
+              </p:cNvPr>
+              <p:cNvSpPr txBox="1"/>
+              <p:nvPr/>
+            </p:nvSpPr>
+            <p:spPr>
+              <a:xfrm>
+                <a:off x="838200" y="2542478"/>
+                <a:ext cx="10251688" cy="2123658"/>
+              </a:xfrm>
+              <a:prstGeom prst="rect">
+                <a:avLst/>
+              </a:prstGeom>
+              <a:noFill/>
+            </p:spPr>
+            <p:txBody>
+              <a:bodyPr wrap="square" rtlCol="0">
+                <a:spAutoFit/>
+              </a:bodyPr>
+              <a:lstStyle/>
+              <a:p>
+                <a:pPr marL="285750" indent="-285750">
+                  <a:buFontTx/>
+                  <a:buChar char="-"/>
+                </a:pPr>
+                <a:r>
+                  <a:rPr lang="en-US" sz="1600" dirty="0"/>
+                  <a:t>Patient’s static features </a:t>
+                </a:r>
+                <a14:m>
+                  <m:oMath xmlns:m="http://schemas.openxmlformats.org/officeDocument/2006/math">
+                    <m:r>
+                      <a:rPr lang="en-US" sz="1600" b="0" i="1" smtClean="0">
+                        <a:latin typeface="Cambria Math" panose="02040503050406030204" pitchFamily="18" charset="0"/>
+                      </a:rPr>
+                      <m:t>𝑍</m:t>
+                    </m:r>
+                  </m:oMath>
+                </a14:m>
+                <a:r>
+                  <a:rPr lang="en-US" sz="1600" dirty="0"/>
+                  <a:t> and time-varying features </a:t>
+                </a:r>
+                <a14:m>
+                  <m:oMath xmlns:m="http://schemas.openxmlformats.org/officeDocument/2006/math">
+                    <m:r>
+                      <a:rPr lang="en-US" sz="1600" b="0" i="1" smtClean="0">
+                        <a:latin typeface="Cambria Math" panose="02040503050406030204" pitchFamily="18" charset="0"/>
+                      </a:rPr>
+                      <m:t>𝑉</m:t>
+                    </m:r>
+                  </m:oMath>
+                </a14:m>
+                <a:r>
+                  <a:rPr lang="en-US" sz="1600" dirty="0"/>
+                  <a:t> are fed into the model and converted to two matrixes of size </a:t>
+                </a:r>
+                <a14:m>
+                  <m:oMath xmlns:m="http://schemas.openxmlformats.org/officeDocument/2006/math">
+                    <m:sSub>
+                      <m:sSubPr>
+                        <m:ctrlPr>
+                          <a:rPr lang="en-US" sz="1600" b="0" i="1" smtClean="0">
+                            <a:latin typeface="Cambria Math" panose="02040503050406030204" pitchFamily="18" charset="0"/>
+                          </a:rPr>
+                        </m:ctrlPr>
+                      </m:sSubPr>
+                      <m:e>
+                        <m:r>
+                          <a:rPr lang="en-US" sz="1600" b="0" i="1" smtClean="0">
+                            <a:latin typeface="Cambria Math" panose="02040503050406030204" pitchFamily="18" charset="0"/>
+                          </a:rPr>
+                          <m:t>𝑡</m:t>
+                        </m:r>
+                      </m:e>
+                      <m:sub>
+                        <m:r>
+                          <a:rPr lang="en-US" sz="1600" b="0" i="1" smtClean="0">
+                            <a:latin typeface="Cambria Math" panose="02040503050406030204" pitchFamily="18" charset="0"/>
+                          </a:rPr>
+                          <m:t>𝑚𝑎𝑥</m:t>
+                        </m:r>
+                      </m:sub>
+                    </m:sSub>
+                  </m:oMath>
+                </a14:m>
+                <a:r>
+                  <a:rPr lang="en-US" sz="1600" dirty="0"/>
+                  <a:t> by </a:t>
+                </a:r>
+                <a14:m>
+                  <m:oMath xmlns:m="http://schemas.openxmlformats.org/officeDocument/2006/math">
+                    <m:sSub>
+                      <m:sSubPr>
+                        <m:ctrlPr>
+                          <a:rPr lang="en-US" sz="1600" b="0" i="1" smtClean="0">
+                            <a:latin typeface="Cambria Math" panose="02040503050406030204" pitchFamily="18" charset="0"/>
+                          </a:rPr>
+                        </m:ctrlPr>
+                      </m:sSubPr>
+                      <m:e>
+                        <m:r>
+                          <a:rPr lang="en-US" sz="1600" b="0" i="1" smtClean="0">
+                            <a:latin typeface="Cambria Math" panose="02040503050406030204" pitchFamily="18" charset="0"/>
+                          </a:rPr>
+                          <m:t>𝑑</m:t>
+                        </m:r>
+                      </m:e>
+                      <m:sub>
+                        <m:r>
+                          <a:rPr lang="en-US" sz="1600" b="0" i="1" smtClean="0">
+                            <a:latin typeface="Cambria Math" panose="02040503050406030204" pitchFamily="18" charset="0"/>
+                          </a:rPr>
+                          <m:t>𝑚𝑜𝑑𝑒𝑙</m:t>
+                        </m:r>
+                      </m:sub>
+                    </m:sSub>
+                  </m:oMath>
+                </a14:m>
+                <a:r>
+                  <a:rPr lang="en-US" sz="1600" dirty="0"/>
+                  <a:t> via linear layers.  </a:t>
+                </a:r>
+              </a:p>
+              <a:p>
+                <a:pPr marL="285750" indent="-285750">
+                  <a:buFontTx/>
+                  <a:buChar char="-"/>
+                </a:pPr>
+                <a:r>
+                  <a:rPr lang="en-US" sz="1600" dirty="0"/>
+                  <a:t>Matrixes are combined and positionally encoded.</a:t>
+                </a:r>
+              </a:p>
+              <a:p>
+                <a:pPr marL="285750" indent="-285750">
+                  <a:buFontTx/>
+                  <a:buChar char="-"/>
+                </a:pPr>
+                <a:r>
+                  <a:rPr lang="en-US" sz="1600" dirty="0"/>
+                  <a:t>Mask is applied to prevent the model from learning from future features at each time step.</a:t>
+                </a:r>
+              </a:p>
+              <a:p>
+                <a:pPr marL="285750" indent="-285750">
+                  <a:buFontTx/>
+                  <a:buChar char="-"/>
+                </a:pPr>
+                <a:r>
+                  <a:rPr lang="en-US" sz="1600" dirty="0"/>
+                  <a:t>Data is passed through two linear feed-forward layers to calculate survival probability at each timestep.  This is restricted between </a:t>
+                </a:r>
+                <a14:m>
+                  <m:oMath xmlns:m="http://schemas.openxmlformats.org/officeDocument/2006/math">
+                    <m:r>
+                      <a:rPr lang="en-US" sz="1600" b="0" i="1" smtClean="0">
+                        <a:latin typeface="Cambria Math" panose="02040503050406030204" pitchFamily="18" charset="0"/>
+                      </a:rPr>
+                      <m:t>1</m:t>
+                    </m:r>
+                    <m:sSup>
+                      <m:sSupPr>
+                        <m:ctrlPr>
+                          <a:rPr lang="en-US" sz="1600" b="0" i="1" smtClean="0">
+                            <a:latin typeface="Cambria Math" panose="02040503050406030204" pitchFamily="18" charset="0"/>
+                          </a:rPr>
+                        </m:ctrlPr>
+                      </m:sSupPr>
+                      <m:e>
+                        <m:r>
+                          <a:rPr lang="en-US" sz="1600" b="0" i="1" smtClean="0">
+                            <a:latin typeface="Cambria Math" panose="02040503050406030204" pitchFamily="18" charset="0"/>
+                          </a:rPr>
+                          <m:t>𝑒</m:t>
+                        </m:r>
+                      </m:e>
+                      <m:sup>
+                        <m:r>
+                          <a:rPr lang="en-US" sz="1600" b="0" i="1" smtClean="0">
+                            <a:latin typeface="Cambria Math" panose="02040503050406030204" pitchFamily="18" charset="0"/>
+                          </a:rPr>
+                          <m:t>−10</m:t>
+                        </m:r>
+                      </m:sup>
+                    </m:sSup>
+                    <m:r>
+                      <a:rPr lang="en-US" sz="1600" b="0" i="1" smtClean="0">
+                        <a:latin typeface="Cambria Math" panose="02040503050406030204" pitchFamily="18" charset="0"/>
+                      </a:rPr>
+                      <m:t> </m:t>
+                    </m:r>
+                  </m:oMath>
+                </a14:m>
+                <a:r>
+                  <a:rPr lang="en-US" sz="1600" dirty="0"/>
+                  <a:t>and </a:t>
+                </a:r>
+                <a14:m>
+                  <m:oMath xmlns:m="http://schemas.openxmlformats.org/officeDocument/2006/math">
+                    <m:r>
+                      <a:rPr lang="en-US" sz="1600" i="1" dirty="0" smtClean="0">
+                        <a:latin typeface="Cambria Math" panose="02040503050406030204" pitchFamily="18" charset="0"/>
+                      </a:rPr>
+                      <m:t>1</m:t>
+                    </m:r>
+                  </m:oMath>
+                </a14:m>
+                <a:r>
+                  <a:rPr lang="en-US" sz="1600" dirty="0"/>
+                  <a:t>.  </a:t>
+                </a:r>
+              </a:p>
+              <a:p>
+                <a:pPr marL="285750" indent="-285750">
+                  <a:buFontTx/>
+                  <a:buChar char="-"/>
+                </a:pPr>
+                <a:r>
+                  <a:rPr lang="en-US" sz="1600" dirty="0"/>
+                  <a:t>Final survival time is reported as sum of all survival probabilities.</a:t>
+                </a:r>
+              </a:p>
+              <a:p>
+                <a:pPr marL="285750" indent="-285750">
+                  <a:buFontTx/>
+                  <a:buChar char="-"/>
+                </a:pPr>
+                <a:r>
+                  <a:rPr lang="en-US" sz="1600" dirty="0"/>
+                  <a:t>Batch size = 32, data trained with K-fold cross validation with 5 folds and 10 epochs per fold.</a:t>
+                </a:r>
+              </a:p>
+            </p:txBody>
+          </p:sp>
+        </mc:Choice>
+        <mc:Fallback>
+          <p:sp>
+            <p:nvSpPr>
+              <p:cNvPr id="7" name="TextBox 6">
+                <a:extLst>
+                  <a:ext uri="{FF2B5EF4-FFF2-40B4-BE49-F238E27FC236}">
+                    <a16:creationId xmlns:a16="http://schemas.microsoft.com/office/drawing/2014/main" id="{99DEA6DD-9A59-E301-5AB0-E4E824F27029}"/>
+                  </a:ext>
+                </a:extLst>
+              </p:cNvPr>
+              <p:cNvSpPr txBox="1">
+                <a:spLocks noRot="1" noChangeAspect="1" noMove="1" noResize="1" noEditPoints="1" noAdjustHandles="1" noChangeArrowheads="1" noChangeShapeType="1" noTextEdit="1"/>
+              </p:cNvSpPr>
+              <p:nvPr/>
+            </p:nvSpPr>
+            <p:spPr>
+              <a:xfrm>
+                <a:off x="838200" y="2542478"/>
+                <a:ext cx="10251688" cy="2123658"/>
+              </a:xfrm>
+              <a:prstGeom prst="rect">
+                <a:avLst/>
+              </a:prstGeom>
+              <a:blipFill>
+                <a:blip r:embed="rId3"/>
+                <a:stretch>
+                  <a:fillRect l="-357" t="-862"/>
+                </a:stretch>
+              </a:blipFill>
+            </p:spPr>
+            <p:txBody>
+              <a:bodyPr/>
+              <a:lstStyle/>
+              <a:p>
+                <a:r>
+                  <a:rPr lang="en-US">
+                    <a:noFill/>
+                  </a:rPr>
+                  <a:t> </a:t>
+                </a:r>
+              </a:p>
+            </p:txBody>
+          </p:sp>
+        </mc:Fallback>
+      </mc:AlternateContent>
     </p:spTree>
     <p:extLst>
       <p:ext uri="{BB962C8B-B14F-4D97-AF65-F5344CB8AC3E}">
@@ -28315,6 +28764,357 @@
   <p:clrMapOvr>
     <a:masterClrMapping/>
   </p:clrMapOvr>
+  <p:timing>
+    <p:tnLst>
+      <p:par>
+        <p:cTn id="1" dur="indefinite" restart="never" nodeType="tmRoot">
+          <p:childTnLst>
+            <p:seq concurrent="1" nextAc="seek">
+              <p:cTn id="2" dur="indefinite" nodeType="mainSeq">
+                <p:childTnLst>
+                  <p:par>
+                    <p:cTn id="3" fill="hold">
+                      <p:stCondLst>
+                        <p:cond delay="indefinite"/>
+                      </p:stCondLst>
+                      <p:childTnLst>
+                        <p:par>
+                          <p:cTn id="4" fill="hold">
+                            <p:stCondLst>
+                              <p:cond delay="0"/>
+                            </p:stCondLst>
+                            <p:childTnLst>
+                              <p:par>
+                                <p:cTn id="5" presetID="22" presetClass="entr" presetSubtype="8" fill="hold" nodeType="clickEffect">
+                                  <p:stCondLst>
+                                    <p:cond delay="0"/>
+                                  </p:stCondLst>
+                                  <p:childTnLst>
+                                    <p:set>
+                                      <p:cBhvr>
+                                        <p:cTn id="6" dur="1" fill="hold">
+                                          <p:stCondLst>
+                                            <p:cond delay="0"/>
+                                          </p:stCondLst>
+                                        </p:cTn>
+                                        <p:tgtEl>
+                                          <p:spTgt spid="7">
+                                            <p:txEl>
+                                              <p:pRg st="0" end="0"/>
+                                            </p:txEl>
+                                          </p:spTgt>
+                                        </p:tgtEl>
+                                        <p:attrNameLst>
+                                          <p:attrName>style.visibility</p:attrName>
+                                        </p:attrNameLst>
+                                      </p:cBhvr>
+                                      <p:to>
+                                        <p:strVal val="visible"/>
+                                      </p:to>
+                                    </p:set>
+                                    <p:animEffect transition="in" filter="wipe(left)">
+                                      <p:cBhvr>
+                                        <p:cTn id="7" dur="500"/>
+                                        <p:tgtEl>
+                                          <p:spTgt spid="7">
+                                            <p:txEl>
+                                              <p:pRg st="0" end="0"/>
+                                            </p:txEl>
+                                          </p:spTgt>
+                                        </p:tgtEl>
+                                      </p:cBhvr>
+                                    </p:animEffect>
+                                  </p:childTnLst>
+                                </p:cTn>
+                              </p:par>
+                            </p:childTnLst>
+                          </p:cTn>
+                        </p:par>
+                        <p:par>
+                          <p:cTn id="8" fill="hold">
+                            <p:stCondLst>
+                              <p:cond delay="500"/>
+                            </p:stCondLst>
+                            <p:childTnLst>
+                              <p:par>
+                                <p:cTn id="9" presetID="22" presetClass="entr" presetSubtype="8" fill="hold" nodeType="afterEffect">
+                                  <p:stCondLst>
+                                    <p:cond delay="0"/>
+                                  </p:stCondLst>
+                                  <p:childTnLst>
+                                    <p:set>
+                                      <p:cBhvr>
+                                        <p:cTn id="10" dur="1" fill="hold">
+                                          <p:stCondLst>
+                                            <p:cond delay="0"/>
+                                          </p:stCondLst>
+                                        </p:cTn>
+                                        <p:tgtEl>
+                                          <p:spTgt spid="7">
+                                            <p:txEl>
+                                              <p:pRg st="1" end="1"/>
+                                            </p:txEl>
+                                          </p:spTgt>
+                                        </p:tgtEl>
+                                        <p:attrNameLst>
+                                          <p:attrName>style.visibility</p:attrName>
+                                        </p:attrNameLst>
+                                      </p:cBhvr>
+                                      <p:to>
+                                        <p:strVal val="visible"/>
+                                      </p:to>
+                                    </p:set>
+                                    <p:animEffect transition="in" filter="wipe(left)">
+                                      <p:cBhvr>
+                                        <p:cTn id="11" dur="500"/>
+                                        <p:tgtEl>
+                                          <p:spTgt spid="7">
+                                            <p:txEl>
+                                              <p:pRg st="1" end="1"/>
+                                            </p:txEl>
+                                          </p:spTgt>
+                                        </p:tgtEl>
+                                      </p:cBhvr>
+                                    </p:animEffect>
+                                  </p:childTnLst>
+                                </p:cTn>
+                              </p:par>
+                            </p:childTnLst>
+                          </p:cTn>
+                        </p:par>
+                        <p:par>
+                          <p:cTn id="12" fill="hold">
+                            <p:stCondLst>
+                              <p:cond delay="1000"/>
+                            </p:stCondLst>
+                            <p:childTnLst>
+                              <p:par>
+                                <p:cTn id="13" presetID="22" presetClass="entr" presetSubtype="8" fill="hold" nodeType="afterEffect">
+                                  <p:stCondLst>
+                                    <p:cond delay="0"/>
+                                  </p:stCondLst>
+                                  <p:childTnLst>
+                                    <p:set>
+                                      <p:cBhvr>
+                                        <p:cTn id="14" dur="1" fill="hold">
+                                          <p:stCondLst>
+                                            <p:cond delay="0"/>
+                                          </p:stCondLst>
+                                        </p:cTn>
+                                        <p:tgtEl>
+                                          <p:spTgt spid="7">
+                                            <p:txEl>
+                                              <p:pRg st="2" end="2"/>
+                                            </p:txEl>
+                                          </p:spTgt>
+                                        </p:tgtEl>
+                                        <p:attrNameLst>
+                                          <p:attrName>style.visibility</p:attrName>
+                                        </p:attrNameLst>
+                                      </p:cBhvr>
+                                      <p:to>
+                                        <p:strVal val="visible"/>
+                                      </p:to>
+                                    </p:set>
+                                    <p:animEffect transition="in" filter="wipe(left)">
+                                      <p:cBhvr>
+                                        <p:cTn id="15" dur="500"/>
+                                        <p:tgtEl>
+                                          <p:spTgt spid="7">
+                                            <p:txEl>
+                                              <p:pRg st="2" end="2"/>
+                                            </p:txEl>
+                                          </p:spTgt>
+                                        </p:tgtEl>
+                                      </p:cBhvr>
+                                    </p:animEffect>
+                                  </p:childTnLst>
+                                </p:cTn>
+                              </p:par>
+                            </p:childTnLst>
+                          </p:cTn>
+                        </p:par>
+                        <p:par>
+                          <p:cTn id="16" fill="hold">
+                            <p:stCondLst>
+                              <p:cond delay="1500"/>
+                            </p:stCondLst>
+                            <p:childTnLst>
+                              <p:par>
+                                <p:cTn id="17" presetID="22" presetClass="entr" presetSubtype="8" fill="hold" nodeType="afterEffect">
+                                  <p:stCondLst>
+                                    <p:cond delay="0"/>
+                                  </p:stCondLst>
+                                  <p:childTnLst>
+                                    <p:set>
+                                      <p:cBhvr>
+                                        <p:cTn id="18" dur="1" fill="hold">
+                                          <p:stCondLst>
+                                            <p:cond delay="0"/>
+                                          </p:stCondLst>
+                                        </p:cTn>
+                                        <p:tgtEl>
+                                          <p:spTgt spid="7">
+                                            <p:txEl>
+                                              <p:pRg st="3" end="3"/>
+                                            </p:txEl>
+                                          </p:spTgt>
+                                        </p:tgtEl>
+                                        <p:attrNameLst>
+                                          <p:attrName>style.visibility</p:attrName>
+                                        </p:attrNameLst>
+                                      </p:cBhvr>
+                                      <p:to>
+                                        <p:strVal val="visible"/>
+                                      </p:to>
+                                    </p:set>
+                                    <p:animEffect transition="in" filter="wipe(left)">
+                                      <p:cBhvr>
+                                        <p:cTn id="19" dur="500"/>
+                                        <p:tgtEl>
+                                          <p:spTgt spid="7">
+                                            <p:txEl>
+                                              <p:pRg st="3" end="3"/>
+                                            </p:txEl>
+                                          </p:spTgt>
+                                        </p:tgtEl>
+                                      </p:cBhvr>
+                                    </p:animEffect>
+                                  </p:childTnLst>
+                                </p:cTn>
+                              </p:par>
+                            </p:childTnLst>
+                          </p:cTn>
+                        </p:par>
+                        <p:par>
+                          <p:cTn id="20" fill="hold">
+                            <p:stCondLst>
+                              <p:cond delay="2000"/>
+                            </p:stCondLst>
+                            <p:childTnLst>
+                              <p:par>
+                                <p:cTn id="21" presetID="22" presetClass="entr" presetSubtype="8" fill="hold" nodeType="afterEffect">
+                                  <p:stCondLst>
+                                    <p:cond delay="0"/>
+                                  </p:stCondLst>
+                                  <p:childTnLst>
+                                    <p:set>
+                                      <p:cBhvr>
+                                        <p:cTn id="22" dur="1" fill="hold">
+                                          <p:stCondLst>
+                                            <p:cond delay="0"/>
+                                          </p:stCondLst>
+                                        </p:cTn>
+                                        <p:tgtEl>
+                                          <p:spTgt spid="7">
+                                            <p:txEl>
+                                              <p:pRg st="4" end="4"/>
+                                            </p:txEl>
+                                          </p:spTgt>
+                                        </p:tgtEl>
+                                        <p:attrNameLst>
+                                          <p:attrName>style.visibility</p:attrName>
+                                        </p:attrNameLst>
+                                      </p:cBhvr>
+                                      <p:to>
+                                        <p:strVal val="visible"/>
+                                      </p:to>
+                                    </p:set>
+                                    <p:animEffect transition="in" filter="wipe(left)">
+                                      <p:cBhvr>
+                                        <p:cTn id="23" dur="500"/>
+                                        <p:tgtEl>
+                                          <p:spTgt spid="7">
+                                            <p:txEl>
+                                              <p:pRg st="4" end="4"/>
+                                            </p:txEl>
+                                          </p:spTgt>
+                                        </p:tgtEl>
+                                      </p:cBhvr>
+                                    </p:animEffect>
+                                  </p:childTnLst>
+                                </p:cTn>
+                              </p:par>
+                            </p:childTnLst>
+                          </p:cTn>
+                        </p:par>
+                        <p:par>
+                          <p:cTn id="24" fill="hold">
+                            <p:stCondLst>
+                              <p:cond delay="2500"/>
+                            </p:stCondLst>
+                            <p:childTnLst>
+                              <p:par>
+                                <p:cTn id="25" presetID="22" presetClass="entr" presetSubtype="8" fill="hold" nodeType="afterEffect">
+                                  <p:stCondLst>
+                                    <p:cond delay="0"/>
+                                  </p:stCondLst>
+                                  <p:childTnLst>
+                                    <p:set>
+                                      <p:cBhvr>
+                                        <p:cTn id="26" dur="1" fill="hold">
+                                          <p:stCondLst>
+                                            <p:cond delay="0"/>
+                                          </p:stCondLst>
+                                        </p:cTn>
+                                        <p:tgtEl>
+                                          <p:spTgt spid="7">
+                                            <p:txEl>
+                                              <p:pRg st="5" end="5"/>
+                                            </p:txEl>
+                                          </p:spTgt>
+                                        </p:tgtEl>
+                                        <p:attrNameLst>
+                                          <p:attrName>style.visibility</p:attrName>
+                                        </p:attrNameLst>
+                                      </p:cBhvr>
+                                      <p:to>
+                                        <p:strVal val="visible"/>
+                                      </p:to>
+                                    </p:set>
+                                    <p:animEffect transition="in" filter="wipe(left)">
+                                      <p:cBhvr>
+                                        <p:cTn id="27" dur="500"/>
+                                        <p:tgtEl>
+                                          <p:spTgt spid="7">
+                                            <p:txEl>
+                                              <p:pRg st="5" end="5"/>
+                                            </p:txEl>
+                                          </p:spTgt>
+                                        </p:tgtEl>
+                                      </p:cBhvr>
+                                    </p:animEffect>
+                                  </p:childTnLst>
+                                </p:cTn>
+                              </p:par>
+                            </p:childTnLst>
+                          </p:cTn>
+                        </p:par>
+                      </p:childTnLst>
+                    </p:cTn>
+                  </p:par>
+                </p:childTnLst>
+              </p:cTn>
+              <p:prevCondLst>
+                <p:cond evt="onPrev" delay="0">
+                  <p:tgtEl>
+                    <p:sldTgt/>
+                  </p:tgtEl>
+                </p:cond>
+              </p:prevCondLst>
+              <p:nextCondLst>
+                <p:cond evt="onNext" delay="0">
+                  <p:tgtEl>
+                    <p:sldTgt/>
+                  </p:tgtEl>
+                </p:cond>
+              </p:nextCondLst>
+            </p:seq>
+          </p:childTnLst>
+        </p:cTn>
+      </p:par>
+    </p:tnLst>
+  </p:timing>
 </p:sld>
 </file>
 
@@ -30507,6 +31307,24 @@
 </p:sld>
 </file>
 
+<file path=ppt/tags/tag1.xml><?xml version="1.0" encoding="utf-8"?>
+<p:tagLst xmlns:a="http://schemas.openxmlformats.org/drawingml/2006/main" xmlns:r="http://schemas.openxmlformats.org/officeDocument/2006/relationships" xmlns:p="http://schemas.openxmlformats.org/presentationml/2006/main">
+  <p:tag name="TIMING" val="|0.7|0.9|0.6|0.6"/>
+</p:tagLst>
+</file>
+
+<file path=ppt/tags/tag2.xml><?xml version="1.0" encoding="utf-8"?>
+<p:tagLst xmlns:a="http://schemas.openxmlformats.org/drawingml/2006/main" xmlns:r="http://schemas.openxmlformats.org/officeDocument/2006/relationships" xmlns:p="http://schemas.openxmlformats.org/presentationml/2006/main">
+  <p:tag name="TIMING" val="|0.7|1.4|0.8"/>
+</p:tagLst>
+</file>
+
+<file path=ppt/tags/tag3.xml><?xml version="1.0" encoding="utf-8"?>
+<p:tagLst xmlns:a="http://schemas.openxmlformats.org/drawingml/2006/main" xmlns:r="http://schemas.openxmlformats.org/officeDocument/2006/relationships" xmlns:p="http://schemas.openxmlformats.org/presentationml/2006/main">
+  <p:tag name="TIMING" val="|1.2"/>
+</p:tagLst>
+</file>
+
 <file path=ppt/theme/theme1.xml><?xml version="1.0" encoding="utf-8"?>
 <a:theme xmlns:a="http://schemas.openxmlformats.org/drawingml/2006/main" name="Office Theme">
   <a:themeElements>

</xml_diff>